<commit_message>
adding correct presentation slides
</commit_message>
<xml_diff>
--- a/3_10_2016/intermediate_workshop_4.pptx
+++ b/3_10_2016/intermediate_workshop_4.pptx
@@ -5730,7 +5730,7 @@
             </a:pPr>
             <a:r>
               <a:rPr lang="en"/>
-              <a:t>Intermediate Workshop #3</a:t>
+              <a:t>Intermediate Workshop #4 (cont’d from #3)</a:t>
             </a:r>
           </a:p>
           <a:p>
@@ -5742,7 +5742,7 @@
             </a:pPr>
             <a:r>
               <a:rPr lang="en"/>
-              <a:t>26 September 2016</a:t>
+              <a:t>3 October 2016</a:t>
             </a:r>
           </a:p>
         </p:txBody>
@@ -10846,6 +10846,44 @@
           </a:p>
         </p:txBody>
       </p:sp>
+      <p:sp>
+        <p:nvSpPr>
+          <p:cNvPr id="198" name="Shape 198"/>
+          <p:cNvSpPr txBox="1"/>
+          <p:nvPr/>
+        </p:nvSpPr>
+        <p:spPr>
+          <a:xfrm>
+            <a:off x="0" y="0"/>
+            <a:ext cx="3000000" cy="3000000"/>
+          </a:xfrm>
+          <a:prstGeom prst="rect">
+            <a:avLst/>
+          </a:prstGeom>
+          <a:noFill/>
+          <a:ln>
+            <a:noFill/>
+          </a:ln>
+        </p:spPr>
+        <p:txBody>
+          <a:bodyPr anchorCtr="0" anchor="ctr" bIns="91425" lIns="91425" rIns="91425" tIns="91425">
+            <a:noAutofit/>
+          </a:bodyPr>
+          <a:lstStyle/>
+          <a:p>
+            <a:pPr lvl="0" rtl="0">
+              <a:spcBef>
+                <a:spcPts val="0"/>
+              </a:spcBef>
+              <a:buNone/>
+            </a:pPr>
+            <a:r>
+              <a:rPr lang="en"/>
+              <a:t> </a:t>
+            </a:r>
+          </a:p>
+        </p:txBody>
+      </p:sp>
     </p:spTree>
   </p:cSld>
   <p:clrMapOvr>
@@ -11461,7 +11499,7 @@
             </a:pPr>
             <a:r>
               <a:rPr lang="en" sz="3000"/>
-              <a:t>Make a function that accepts a number and prints that many numbers in the fibonacci sequence. Limit the input to &gt;=200.</a:t>
+              <a:t>Make a function that accepts a number and prints that many numbers in the fibonacci sequence. Limit the input to &lt;=200.</a:t>
             </a:r>
           </a:p>
           <a:p>

</xml_diff>